<commit_message>
A few more IR Attack Info
</commit_message>
<xml_diff>
--- a/doc/tex/sdf/tq_76558_cow_protocol/figures_raw/Diagrama de blocos.pptx
+++ b/doc/tex/sdf/tq_76558_cow_protocol/figures_raw/Diagrama de blocos.pptx
@@ -7,6 +7,8 @@
   <p:sldIdLst>
     <p:sldId id="256" r:id="rId2"/>
     <p:sldId id="257" r:id="rId3"/>
+    <p:sldId id="258" r:id="rId4"/>
+    <p:sldId id="259" r:id="rId5"/>
   </p:sldIdLst>
   <p:sldSz cx="12192000" cy="6858000"/>
   <p:notesSz cx="6858000" cy="9144000"/>
@@ -262,7 +264,7 @@
           <a:p>
             <a:fld id="{F0CB184E-93B9-47FD-91B3-6EDFF3BD873A}" type="datetimeFigureOut">
               <a:rPr lang="en-GB" smtClean="0"/>
-              <a:t>26/11/2018</a:t>
+              <a:t>03/12/2018</a:t>
             </a:fld>
             <a:endParaRPr lang="en-GB"/>
           </a:p>
@@ -462,7 +464,7 @@
           <a:p>
             <a:fld id="{F0CB184E-93B9-47FD-91B3-6EDFF3BD873A}" type="datetimeFigureOut">
               <a:rPr lang="en-GB" smtClean="0"/>
-              <a:t>26/11/2018</a:t>
+              <a:t>03/12/2018</a:t>
             </a:fld>
             <a:endParaRPr lang="en-GB"/>
           </a:p>
@@ -672,7 +674,7 @@
           <a:p>
             <a:fld id="{F0CB184E-93B9-47FD-91B3-6EDFF3BD873A}" type="datetimeFigureOut">
               <a:rPr lang="en-GB" smtClean="0"/>
-              <a:t>26/11/2018</a:t>
+              <a:t>03/12/2018</a:t>
             </a:fld>
             <a:endParaRPr lang="en-GB"/>
           </a:p>
@@ -872,7 +874,7 @@
           <a:p>
             <a:fld id="{F0CB184E-93B9-47FD-91B3-6EDFF3BD873A}" type="datetimeFigureOut">
               <a:rPr lang="en-GB" smtClean="0"/>
-              <a:t>26/11/2018</a:t>
+              <a:t>03/12/2018</a:t>
             </a:fld>
             <a:endParaRPr lang="en-GB"/>
           </a:p>
@@ -1148,7 +1150,7 @@
           <a:p>
             <a:fld id="{F0CB184E-93B9-47FD-91B3-6EDFF3BD873A}" type="datetimeFigureOut">
               <a:rPr lang="en-GB" smtClean="0"/>
-              <a:t>26/11/2018</a:t>
+              <a:t>03/12/2018</a:t>
             </a:fld>
             <a:endParaRPr lang="en-GB"/>
           </a:p>
@@ -1416,7 +1418,7 @@
           <a:p>
             <a:fld id="{F0CB184E-93B9-47FD-91B3-6EDFF3BD873A}" type="datetimeFigureOut">
               <a:rPr lang="en-GB" smtClean="0"/>
-              <a:t>26/11/2018</a:t>
+              <a:t>03/12/2018</a:t>
             </a:fld>
             <a:endParaRPr lang="en-GB"/>
           </a:p>
@@ -1831,7 +1833,7 @@
           <a:p>
             <a:fld id="{F0CB184E-93B9-47FD-91B3-6EDFF3BD873A}" type="datetimeFigureOut">
               <a:rPr lang="en-GB" smtClean="0"/>
-              <a:t>26/11/2018</a:t>
+              <a:t>03/12/2018</a:t>
             </a:fld>
             <a:endParaRPr lang="en-GB"/>
           </a:p>
@@ -1973,7 +1975,7 @@
           <a:p>
             <a:fld id="{F0CB184E-93B9-47FD-91B3-6EDFF3BD873A}" type="datetimeFigureOut">
               <a:rPr lang="en-GB" smtClean="0"/>
-              <a:t>26/11/2018</a:t>
+              <a:t>03/12/2018</a:t>
             </a:fld>
             <a:endParaRPr lang="en-GB"/>
           </a:p>
@@ -2086,7 +2088,7 @@
           <a:p>
             <a:fld id="{F0CB184E-93B9-47FD-91B3-6EDFF3BD873A}" type="datetimeFigureOut">
               <a:rPr lang="en-GB" smtClean="0"/>
-              <a:t>26/11/2018</a:t>
+              <a:t>03/12/2018</a:t>
             </a:fld>
             <a:endParaRPr lang="en-GB"/>
           </a:p>
@@ -2399,7 +2401,7 @@
           <a:p>
             <a:fld id="{F0CB184E-93B9-47FD-91B3-6EDFF3BD873A}" type="datetimeFigureOut">
               <a:rPr lang="en-GB" smtClean="0"/>
-              <a:t>26/11/2018</a:t>
+              <a:t>03/12/2018</a:t>
             </a:fld>
             <a:endParaRPr lang="en-GB"/>
           </a:p>
@@ -2688,7 +2690,7 @@
           <a:p>
             <a:fld id="{F0CB184E-93B9-47FD-91B3-6EDFF3BD873A}" type="datetimeFigureOut">
               <a:rPr lang="en-GB" smtClean="0"/>
-              <a:t>26/11/2018</a:t>
+              <a:t>03/12/2018</a:t>
             </a:fld>
             <a:endParaRPr lang="en-GB"/>
           </a:p>
@@ -2936,7 +2938,7 @@
           <a:p>
             <a:fld id="{F0CB184E-93B9-47FD-91B3-6EDFF3BD873A}" type="datetimeFigureOut">
               <a:rPr lang="en-GB" smtClean="0"/>
-              <a:t>26/11/2018</a:t>
+              <a:t>03/12/2018</a:t>
             </a:fld>
             <a:endParaRPr lang="en-GB"/>
           </a:p>
@@ -7852,6 +7854,235 @@
 </p:sld>
 </file>
 
+<file path=ppt/slides/slide3.xml><?xml version="1.0" encoding="utf-8"?>
+<p:sld xmlns:a="http://schemas.openxmlformats.org/drawingml/2006/main" xmlns:r="http://schemas.openxmlformats.org/officeDocument/2006/relationships" xmlns:p="http://schemas.openxmlformats.org/presentationml/2006/main">
+  <p:cSld>
+    <p:spTree>
+      <p:nvGrpSpPr>
+        <p:cNvPr id="1" name=""/>
+        <p:cNvGrpSpPr/>
+        <p:nvPr/>
+      </p:nvGrpSpPr>
+      <p:grpSpPr>
+        <a:xfrm>
+          <a:off x="0" y="0"/>
+          <a:ext cx="0" cy="0"/>
+          <a:chOff x="0" y="0"/>
+          <a:chExt cx="0" cy="0"/>
+        </a:xfrm>
+      </p:grpSpPr>
+      <p:pic>
+        <p:nvPicPr>
+          <p:cNvPr id="6" name="Imagem 5">
+            <a:extLst>
+              <a:ext uri="{FF2B5EF4-FFF2-40B4-BE49-F238E27FC236}">
+                <a16:creationId xmlns:a16="http://schemas.microsoft.com/office/drawing/2014/main" id="{21303F21-C9E6-4872-BF9D-A6DC030C21B3}"/>
+              </a:ext>
+            </a:extLst>
+          </p:cNvPr>
+          <p:cNvPicPr>
+            <a:picLocks noChangeAspect="1"/>
+          </p:cNvPicPr>
+          <p:nvPr/>
+        </p:nvPicPr>
+        <p:blipFill>
+          <a:blip r:embed="rId2"/>
+          <a:stretch>
+            <a:fillRect/>
+          </a:stretch>
+        </p:blipFill>
+        <p:spPr>
+          <a:xfrm>
+            <a:off x="-1188720" y="1431128"/>
+            <a:ext cx="11396749" cy="5778900"/>
+          </a:xfrm>
+          <a:prstGeom prst="rect">
+            <a:avLst/>
+          </a:prstGeom>
+        </p:spPr>
+      </p:pic>
+      <p:pic>
+        <p:nvPicPr>
+          <p:cNvPr id="8" name="Imagem 7">
+            <a:extLst>
+              <a:ext uri="{FF2B5EF4-FFF2-40B4-BE49-F238E27FC236}">
+                <a16:creationId xmlns:a16="http://schemas.microsoft.com/office/drawing/2014/main" id="{A2167A3C-6BCA-4E70-B03A-0E3A077ECFE7}"/>
+              </a:ext>
+            </a:extLst>
+          </p:cNvPr>
+          <p:cNvPicPr>
+            <a:picLocks noChangeAspect="1"/>
+          </p:cNvPicPr>
+          <p:nvPr/>
+        </p:nvPicPr>
+        <p:blipFill>
+          <a:blip r:embed="rId3"/>
+          <a:stretch>
+            <a:fillRect/>
+          </a:stretch>
+        </p:blipFill>
+        <p:spPr>
+          <a:xfrm>
+            <a:off x="41092" y="32185"/>
+            <a:ext cx="9744075" cy="1257300"/>
+          </a:xfrm>
+          <a:prstGeom prst="rect">
+            <a:avLst/>
+          </a:prstGeom>
+        </p:spPr>
+      </p:pic>
+      <p:pic>
+        <p:nvPicPr>
+          <p:cNvPr id="7" name="Imagem 6">
+            <a:extLst>
+              <a:ext uri="{FF2B5EF4-FFF2-40B4-BE49-F238E27FC236}">
+                <a16:creationId xmlns:a16="http://schemas.microsoft.com/office/drawing/2014/main" id="{4677BE23-C1A6-4A02-B606-330693E8D327}"/>
+              </a:ext>
+            </a:extLst>
+          </p:cNvPr>
+          <p:cNvPicPr>
+            <a:picLocks noChangeAspect="1"/>
+          </p:cNvPicPr>
+          <p:nvPr/>
+        </p:nvPicPr>
+        <p:blipFill>
+          <a:blip r:embed="rId4"/>
+          <a:stretch>
+            <a:fillRect/>
+          </a:stretch>
+        </p:blipFill>
+        <p:spPr>
+          <a:xfrm>
+            <a:off x="7151023" y="1104523"/>
+            <a:ext cx="4991100" cy="1228725"/>
+          </a:xfrm>
+          <a:prstGeom prst="rect">
+            <a:avLst/>
+          </a:prstGeom>
+        </p:spPr>
+      </p:pic>
+    </p:spTree>
+    <p:extLst>
+      <p:ext uri="{BB962C8B-B14F-4D97-AF65-F5344CB8AC3E}">
+        <p14:creationId xmlns:p14="http://schemas.microsoft.com/office/powerpoint/2010/main" val="2824188756"/>
+      </p:ext>
+    </p:extLst>
+  </p:cSld>
+  <p:clrMapOvr>
+    <a:masterClrMapping/>
+  </p:clrMapOvr>
+</p:sld>
+</file>
+
+<file path=ppt/slides/slide4.xml><?xml version="1.0" encoding="utf-8"?>
+<p:sld xmlns:a="http://schemas.openxmlformats.org/drawingml/2006/main" xmlns:r="http://schemas.openxmlformats.org/officeDocument/2006/relationships" xmlns:p="http://schemas.openxmlformats.org/presentationml/2006/main">
+  <p:cSld>
+    <p:spTree>
+      <p:nvGrpSpPr>
+        <p:cNvPr id="1" name=""/>
+        <p:cNvGrpSpPr/>
+        <p:nvPr/>
+      </p:nvGrpSpPr>
+      <p:grpSpPr>
+        <a:xfrm>
+          <a:off x="0" y="0"/>
+          <a:ext cx="0" cy="0"/>
+          <a:chOff x="0" y="0"/>
+          <a:chExt cx="0" cy="0"/>
+        </a:xfrm>
+      </p:grpSpPr>
+      <p:grpSp>
+        <p:nvGrpSpPr>
+          <p:cNvPr id="5" name="Agrupar 4">
+            <a:extLst>
+              <a:ext uri="{FF2B5EF4-FFF2-40B4-BE49-F238E27FC236}">
+                <a16:creationId xmlns:a16="http://schemas.microsoft.com/office/drawing/2014/main" id="{CBF53BE5-05ED-4893-BD68-D5DCCF8AF96A}"/>
+              </a:ext>
+            </a:extLst>
+          </p:cNvPr>
+          <p:cNvGrpSpPr/>
+          <p:nvPr/>
+        </p:nvGrpSpPr>
+        <p:grpSpPr>
+          <a:xfrm>
+            <a:off x="2617124" y="2395797"/>
+            <a:ext cx="6957752" cy="2066406"/>
+            <a:chOff x="4915939" y="4616420"/>
+            <a:chExt cx="6957752" cy="2066406"/>
+          </a:xfrm>
+        </p:grpSpPr>
+        <p:pic>
+          <p:nvPicPr>
+            <p:cNvPr id="3" name="Imagem 2">
+              <a:extLst>
+                <a:ext uri="{FF2B5EF4-FFF2-40B4-BE49-F238E27FC236}">
+                  <a16:creationId xmlns:a16="http://schemas.microsoft.com/office/drawing/2014/main" id="{5CD1FB50-A77C-48D3-97E9-56AF14B25EDF}"/>
+                </a:ext>
+              </a:extLst>
+            </p:cNvPr>
+            <p:cNvPicPr>
+              <a:picLocks noChangeAspect="1"/>
+            </p:cNvPicPr>
+            <p:nvPr/>
+          </p:nvPicPr>
+          <p:blipFill rotWithShape="1">
+            <a:blip r:embed="rId2"/>
+            <a:srcRect l="892" r="1320" b="9524"/>
+            <a:stretch/>
+          </p:blipFill>
+          <p:spPr>
+            <a:xfrm>
+              <a:off x="4915939" y="4616420"/>
+              <a:ext cx="6957752" cy="904875"/>
+            </a:xfrm>
+            <a:prstGeom prst="rect">
+              <a:avLst/>
+            </a:prstGeom>
+          </p:spPr>
+        </p:pic>
+        <p:pic>
+          <p:nvPicPr>
+            <p:cNvPr id="4" name="Imagem 3">
+              <a:extLst>
+                <a:ext uri="{FF2B5EF4-FFF2-40B4-BE49-F238E27FC236}">
+                  <a16:creationId xmlns:a16="http://schemas.microsoft.com/office/drawing/2014/main" id="{53D47A5A-B5F5-4548-8CCB-96D3D13CEF8F}"/>
+                </a:ext>
+              </a:extLst>
+            </p:cNvPr>
+            <p:cNvPicPr>
+              <a:picLocks noChangeAspect="1"/>
+            </p:cNvPicPr>
+            <p:nvPr/>
+          </p:nvPicPr>
+          <p:blipFill rotWithShape="1">
+            <a:blip r:embed="rId3"/>
+            <a:srcRect l="1012" t="19349"/>
+            <a:stretch/>
+          </p:blipFill>
+          <p:spPr>
+            <a:xfrm>
+              <a:off x="6254288" y="5953038"/>
+              <a:ext cx="4356042" cy="729788"/>
+            </a:xfrm>
+            <a:prstGeom prst="rect">
+              <a:avLst/>
+            </a:prstGeom>
+          </p:spPr>
+        </p:pic>
+      </p:grpSp>
+    </p:spTree>
+    <p:extLst>
+      <p:ext uri="{BB962C8B-B14F-4D97-AF65-F5344CB8AC3E}">
+        <p14:creationId xmlns:p14="http://schemas.microsoft.com/office/powerpoint/2010/main" val="409310104"/>
+      </p:ext>
+    </p:extLst>
+  </p:cSld>
+  <p:clrMapOvr>
+    <a:masterClrMapping/>
+  </p:clrMapOvr>
+</p:sld>
+</file>
+
 <file path=ppt/theme/theme1.xml><?xml version="1.0" encoding="utf-8"?>
 <a:theme xmlns:a="http://schemas.openxmlformats.org/drawingml/2006/main" name="Tema do Office">
   <a:themeElements>

</xml_diff>